<commit_message>
minor improvements in presentations
</commit_message>
<xml_diff>
--- a/for-posdealers/presentation/sales/media/posdealer-sales-rollout.pptx
+++ b/for-posdealers/presentation/sales/media/posdealer-sales-rollout.pptx
@@ -9287,7 +9287,7 @@
           <a:p>
             <a:fld id="{878DCA2D-ADC9-4D7A-A916-9A90AC8F3FDD}" type="datetimeFigureOut">
               <a:rPr lang="de-DE" smtClean="0"/>
-              <a:t>07.10.20</a:t>
+              <a:t>13.10.20</a:t>
             </a:fld>
             <a:endParaRPr lang="de-DE"/>
           </a:p>
@@ -13206,7 +13206,7 @@
             <a:fld id="{F9CF9B13-D011-40B4-B116-4AFF51B22AA5}" type="datetime1">
               <a:rPr lang="de-DE" smtClean="0"/>
               <a:pPr/>
-              <a:t>07.10.20</a:t>
+              <a:t>13.10.20</a:t>
             </a:fld>
             <a:r>
               <a:rPr lang="de-DE"/>
@@ -13566,7 +13566,7 @@
             <a:fld id="{F9CF9B13-D011-40B4-B116-4AFF51B22AA5}" type="datetime1">
               <a:rPr lang="de-DE" smtClean="0"/>
               <a:pPr/>
-              <a:t>07.10.20</a:t>
+              <a:t>13.10.20</a:t>
             </a:fld>
             <a:r>
               <a:rPr lang="de-DE"/>
@@ -13788,7 +13788,7 @@
             <a:fld id="{EDCB950E-FDB1-4BA4-AE2E-92802DA17835}" type="datetime1">
               <a:rPr lang="de-DE" smtClean="0"/>
               <a:pPr/>
-              <a:t>07.10.20</a:t>
+              <a:t>13.10.20</a:t>
             </a:fld>
             <a:endParaRPr lang="de-DE"/>
           </a:p>
@@ -14246,7 +14246,7 @@
           <a:p>
             <a:fld id="{EA38D6C4-32A5-4B1B-BEC5-546FAB3E61DF}" type="datetime1">
               <a:rPr lang="de-DE" smtClean="0"/>
-              <a:t>07.10.20</a:t>
+              <a:t>13.10.20</a:t>
             </a:fld>
             <a:endParaRPr lang="de-DE"/>
           </a:p>
@@ -14758,7 +14758,7 @@
             <a:fld id="{F9CF9B13-D011-40B4-B116-4AFF51B22AA5}" type="datetime1">
               <a:rPr lang="de-DE"/>
               <a:pPr/>
-              <a:t>07.10.20</a:t>
+              <a:t>13.10.20</a:t>
             </a:fld>
             <a:r>
               <a:rPr lang="de-DE"/>
@@ -15011,7 +15011,7 @@
             <a:fld id="{F9CF9B13-D011-40B4-B116-4AFF51B22AA5}" type="datetime1">
               <a:rPr lang="de-DE" smtClean="0"/>
               <a:pPr/>
-              <a:t>07.10.20</a:t>
+              <a:t>13.10.20</a:t>
             </a:fld>
             <a:r>
               <a:rPr lang="de-DE"/>
@@ -15697,7 +15697,7 @@
             <a:fld id="{F9CF9B13-D011-40B4-B116-4AFF51B22AA5}" type="datetime1">
               <a:rPr lang="de-DE" smtClean="0"/>
               <a:pPr/>
-              <a:t>07.10.20</a:t>
+              <a:t>13.10.20</a:t>
             </a:fld>
             <a:r>
               <a:rPr lang="de-DE"/>
@@ -15940,7 +15940,7 @@
             <a:fld id="{F9CF9B13-D011-40B4-B116-4AFF51B22AA5}" type="datetime1">
               <a:rPr lang="de-DE" smtClean="0"/>
               <a:pPr/>
-              <a:t>07.10.20</a:t>
+              <a:t>13.10.20</a:t>
             </a:fld>
             <a:r>
               <a:rPr lang="de-DE"/>
@@ -16571,7 +16571,7 @@
             <a:fld id="{F9CF9B13-D011-40B4-B116-4AFF51B22AA5}" type="datetime1">
               <a:rPr lang="de-DE" smtClean="0"/>
               <a:pPr/>
-              <a:t>07.10.20</a:t>
+              <a:t>13.10.20</a:t>
             </a:fld>
             <a:r>
               <a:rPr lang="de-DE"/>
@@ -16775,7 +16775,7 @@
             <a:fld id="{F9CF9B13-D011-40B4-B116-4AFF51B22AA5}" type="datetime1">
               <a:rPr lang="de-DE" smtClean="0"/>
               <a:pPr/>
-              <a:t>07.10.20</a:t>
+              <a:t>13.10.20</a:t>
             </a:fld>
             <a:r>
               <a:rPr lang="de-DE"/>
@@ -16969,7 +16969,7 @@
             <a:fld id="{F9CF9B13-D011-40B4-B116-4AFF51B22AA5}" type="datetime1">
               <a:rPr lang="de-DE" smtClean="0"/>
               <a:pPr/>
-              <a:t>07.10.20</a:t>
+              <a:t>13.10.20</a:t>
             </a:fld>
             <a:r>
               <a:rPr lang="de-DE"/>
@@ -17232,7 +17232,7 @@
             <a:fld id="{F9CF9B13-D011-40B4-B116-4AFF51B22AA5}" type="datetime1">
               <a:rPr lang="de-DE" smtClean="0"/>
               <a:pPr/>
-              <a:t>07.10.20</a:t>
+              <a:t>13.10.20</a:t>
             </a:fld>
             <a:r>
               <a:rPr lang="de-DE"/>
@@ -17470,7 +17470,7 @@
             <a:fld id="{F9CF9B13-D011-40B4-B116-4AFF51B22AA5}" type="datetime1">
               <a:rPr lang="de-DE" smtClean="0"/>
               <a:pPr/>
-              <a:t>07.10.20</a:t>
+              <a:t>13.10.20</a:t>
             </a:fld>
             <a:r>
               <a:rPr lang="de-DE"/>
@@ -17864,7 +17864,7 @@
             <a:fld id="{F9CF9B13-D011-40B4-B116-4AFF51B22AA5}" type="datetime1">
               <a:rPr lang="de-DE" smtClean="0"/>
               <a:pPr/>
-              <a:t>07.10.20</a:t>
+              <a:t>13.10.20</a:t>
             </a:fld>
             <a:r>
               <a:rPr lang="de-DE"/>
@@ -18111,7 +18111,7 @@
             <a:fld id="{F9CF9B13-D011-40B4-B116-4AFF51B22AA5}" type="datetime1">
               <a:rPr lang="de-DE" smtClean="0"/>
               <a:pPr/>
-              <a:t>07.10.20</a:t>
+              <a:t>13.10.20</a:t>
             </a:fld>
             <a:r>
               <a:rPr lang="de-DE"/>
@@ -18567,7 +18567,7 @@
             <a:fld id="{F9CF9B13-D011-40B4-B116-4AFF51B22AA5}" type="datetime1">
               <a:rPr lang="de-DE" smtClean="0"/>
               <a:pPr/>
-              <a:t>07.10.20</a:t>
+              <a:t>13.10.20</a:t>
             </a:fld>
             <a:r>
               <a:rPr lang="de-DE"/>
@@ -18675,7 +18675,7 @@
             <a:fld id="{F9CF9B13-D011-40B4-B116-4AFF51B22AA5}" type="datetime1">
               <a:rPr lang="de-DE" smtClean="0"/>
               <a:pPr/>
-              <a:t>07.10.20</a:t>
+              <a:t>13.10.20</a:t>
             </a:fld>
             <a:r>
               <a:rPr lang="de-DE"/>
@@ -18871,7 +18871,7 @@
             <a:fld id="{F9CF9B13-D011-40B4-B116-4AFF51B22AA5}" type="datetime1">
               <a:rPr lang="de-DE" smtClean="0"/>
               <a:pPr/>
-              <a:t>07.10.20</a:t>
+              <a:t>13.10.20</a:t>
             </a:fld>
             <a:r>
               <a:rPr lang="de-DE"/>
@@ -18973,7 +18973,7 @@
             <a:fld id="{F9CF9B13-D011-40B4-B116-4AFF51B22AA5}" type="datetime1">
               <a:rPr lang="de-DE" smtClean="0"/>
               <a:pPr/>
-              <a:t>07.10.20</a:t>
+              <a:t>13.10.20</a:t>
             </a:fld>
             <a:r>
               <a:rPr lang="de-DE"/>
@@ -21553,7 +21553,7 @@
             <a:fld id="{F9CF9B13-D011-40B4-B116-4AFF51B22AA5}" type="datetime1">
               <a:rPr lang="de-DE" smtClean="0"/>
               <a:pPr/>
-              <a:t>07.10.20</a:t>
+              <a:t>13.10.20</a:t>
             </a:fld>
             <a:r>
               <a:rPr lang="de-DE"/>
@@ -21768,7 +21768,7 @@
             <a:fld id="{F9CF9B13-D011-40B4-B116-4AFF51B22AA5}" type="datetime1">
               <a:rPr lang="de-DE" smtClean="0"/>
               <a:pPr/>
-              <a:t>07.10.20</a:t>
+              <a:t>13.10.20</a:t>
             </a:fld>
             <a:r>
               <a:rPr lang="de-DE"/>
@@ -21879,7 +21879,7 @@
             <a:fld id="{F9CF9B13-D011-40B4-B116-4AFF51B22AA5}" type="datetime1">
               <a:rPr lang="de-DE" smtClean="0"/>
               <a:pPr/>
-              <a:t>07.10.20</a:t>
+              <a:t>13.10.20</a:t>
             </a:fld>
             <a:r>
               <a:rPr lang="de-DE"/>
@@ -22026,7 +22026,7 @@
             <a:fld id="{F9CF9B13-D011-40B4-B116-4AFF51B22AA5}" type="datetime1">
               <a:rPr lang="de-DE" smtClean="0"/>
               <a:pPr/>
-              <a:t>07.10.20</a:t>
+              <a:t>13.10.20</a:t>
             </a:fld>
             <a:r>
               <a:rPr lang="de-DE"/>
@@ -22043,10 +22043,10 @@
       </p:sp>
       <p:pic>
         <p:nvPicPr>
-          <p:cNvPr id="6" name="Picture 5" descr="Diagram&#10;&#10;Description automatically generated">
+          <p:cNvPr id="3" name="Picture 2" descr="Diagram&#10;&#10;Description automatically generated">
             <a:extLst>
               <a:ext uri="{FF2B5EF4-FFF2-40B4-BE49-F238E27FC236}">
-                <a16:creationId xmlns:a16="http://schemas.microsoft.com/office/drawing/2014/main" id="{B3C494C5-4322-8040-8A58-17F0700DD2F3}"/>
+                <a16:creationId xmlns:a16="http://schemas.microsoft.com/office/drawing/2014/main" id="{6DF4CBCF-F39D-3040-BBBD-02E54CA4BA65}"/>
               </a:ext>
             </a:extLst>
           </p:cNvPr>
@@ -22069,8 +22069,8 @@
         </p:blipFill>
         <p:spPr>
           <a:xfrm>
-            <a:off x="1092200" y="850326"/>
-            <a:ext cx="10007600" cy="5444611"/>
+            <a:off x="1132066" y="1051682"/>
+            <a:ext cx="9231133" cy="5272956"/>
           </a:xfrm>
           <a:prstGeom prst="rect">
             <a:avLst/>
@@ -22317,7 +22317,7 @@
             <a:fld id="{F9CF9B13-D011-40B4-B116-4AFF51B22AA5}" type="datetime1">
               <a:rPr lang="de-DE" smtClean="0"/>
               <a:pPr/>
-              <a:t>07.10.20</a:t>
+              <a:t>13.10.20</a:t>
             </a:fld>
             <a:r>
               <a:rPr lang="de-DE"/>
@@ -22855,7 +22855,7 @@
             <a:fld id="{F9CF9B13-D011-40B4-B116-4AFF51B22AA5}" type="datetime1">
               <a:rPr lang="de-DE" smtClean="0"/>
               <a:pPr/>
-              <a:t>07.10.20</a:t>
+              <a:t>13.10.20</a:t>
             </a:fld>
             <a:r>
               <a:rPr lang="de-DE"/>
@@ -22963,7 +22963,7 @@
             <a:fld id="{F9CF9B13-D011-40B4-B116-4AFF51B22AA5}" type="datetime1">
               <a:rPr lang="de-DE" smtClean="0"/>
               <a:pPr/>
-              <a:t>07.10.20</a:t>
+              <a:t>13.10.20</a:t>
             </a:fld>
             <a:r>
               <a:rPr lang="de-DE"/>
@@ -23624,6 +23624,15 @@
 </file>
 
 <file path=customXml/item2.xml><?xml version="1.0" encoding="utf-8"?>
+<?mso-contentType ?>
+<FormTemplates xmlns="http://schemas.microsoft.com/sharepoint/v3/contenttype/forms">
+  <Display>DocumentLibraryForm</Display>
+  <Edit>DocumentLibraryForm</Edit>
+  <New>DocumentLibraryForm</New>
+</FormTemplates>
+</file>
+
+<file path=customXml/item3.xml><?xml version="1.0" encoding="utf-8"?>
 <ct:contentTypeSchema xmlns:ct="http://schemas.microsoft.com/office/2006/metadata/contentType" xmlns:ma="http://schemas.microsoft.com/office/2006/metadata/properties/metaAttributes" ct:_="" ma:_="" ma:contentTypeName="Dokument" ma:contentTypeID="0x01010003A087929988544A956B845A242A1874" ma:contentTypeVersion="9" ma:contentTypeDescription="Ein neues Dokument erstellen." ma:contentTypeScope="" ma:versionID="8fcee6ad74384aaf9bbc4d877337004d">
   <xsd:schema xmlns:xsd="http://www.w3.org/2001/XMLSchema" xmlns:xs="http://www.w3.org/2001/XMLSchema" xmlns:p="http://schemas.microsoft.com/office/2006/metadata/properties" xmlns:ns2="c3142773-ea53-476f-8961-6b85122cde25" targetNamespace="http://schemas.microsoft.com/office/2006/metadata/properties" ma:root="true" ma:fieldsID="a573346e6707e52bf95e9f5c0e472ecc" ns2:_="">
     <xsd:import namespace="c3142773-ea53-476f-8961-6b85122cde25"/>
@@ -23801,15 +23810,6 @@
 </ct:contentTypeSchema>
 </file>
 
-<file path=customXml/item3.xml><?xml version="1.0" encoding="utf-8"?>
-<?mso-contentType ?>
-<FormTemplates xmlns="http://schemas.microsoft.com/sharepoint/v3/contenttype/forms">
-  <Display>DocumentLibraryForm</Display>
-  <Edit>DocumentLibraryForm</Edit>
-  <New>DocumentLibraryForm</New>
-</FormTemplates>
-</file>
-
 <file path=customXml/itemProps1.xml><?xml version="1.0" encoding="utf-8"?>
 <ds:datastoreItem xmlns:ds="http://schemas.openxmlformats.org/officeDocument/2006/customXml" ds:itemID="{5AF2D8DD-AF33-4A08-A2E3-2004F6A6957D}">
   <ds:schemaRefs>
@@ -23828,6 +23828,14 @@
 </file>
 
 <file path=customXml/itemProps2.xml><?xml version="1.0" encoding="utf-8"?>
+<ds:datastoreItem xmlns:ds="http://schemas.openxmlformats.org/officeDocument/2006/customXml" ds:itemID="{13D6CB1D-6628-4D5C-8ECC-C7DF45EC7E07}">
+  <ds:schemaRefs>
+    <ds:schemaRef ds:uri="http://schemas.microsoft.com/sharepoint/v3/contenttype/forms"/>
+  </ds:schemaRefs>
+</ds:datastoreItem>
+</file>
+
+<file path=customXml/itemProps3.xml><?xml version="1.0" encoding="utf-8"?>
 <ds:datastoreItem xmlns:ds="http://schemas.openxmlformats.org/officeDocument/2006/customXml" ds:itemID="{38606AD6-87A1-436A-AEFD-E99610E3D2EE}">
   <ds:schemaRefs>
     <ds:schemaRef ds:uri="http://schemas.microsoft.com/office/2006/metadata/contentType"/>
@@ -23843,12 +23851,4 @@
     <ds:schemaRef ds:uri="http://schemas.microsoft.com/internal/obd"/>
   </ds:schemaRefs>
 </ds:datastoreItem>
-</file>
-
-<file path=customXml/itemProps3.xml><?xml version="1.0" encoding="utf-8"?>
-<ds:datastoreItem xmlns:ds="http://schemas.openxmlformats.org/officeDocument/2006/customXml" ds:itemID="{13D6CB1D-6628-4D5C-8ECC-C7DF45EC7E07}">
-  <ds:schemaRefs>
-    <ds:schemaRef ds:uri="http://schemas.microsoft.com/sharepoint/v3/contenttype/forms"/>
-  </ds:schemaRefs>
-</ds:datastoreItem>
 </file>
</xml_diff>